<commit_message>
update doc presentations per hyperlinks
</commit_message>
<xml_diff>
--- a/docs/OpenFDA Adverse.pptx
+++ b/docs/OpenFDA Adverse.pptx
@@ -6092,19 +6092,7 @@
             </a:br>
             <a:r>
               <a:rPr lang="en-US" sz="4000" dirty="0" smtClean="0"/>
-              <a:t>Drug </a:t>
-            </a:r>
-            <a:r>
-              <a:rPr lang="en-US" sz="4000" dirty="0" smtClean="0"/>
-              <a:t>Prescriptions </a:t>
-            </a:r>
-            <a:r>
-              <a:rPr lang="en-US" sz="4000" dirty="0" smtClean="0"/>
-              <a:t>&amp; </a:t>
-            </a:r>
-            <a:r>
-              <a:rPr lang="en-US" sz="4000" dirty="0" smtClean="0"/>
-              <a:t>Reactions </a:t>
+              <a:t>Drug Prescriptions &amp; Reactions </a:t>
             </a:r>
             <a:r>
               <a:rPr lang="en-US" sz="4000" dirty="0"/>
@@ -8482,21 +8470,13 @@
           <a:p>
             <a:r>
               <a:rPr lang="en-US" dirty="0" smtClean="0"/>
-              <a:t>4970 </a:t>
-            </a:r>
+              <a:t>4970 Visible Nodes (Drug Matrix)</a:t>
+            </a:r>
+          </a:p>
+          <a:p>
             <a:r>
               <a:rPr lang="en-US" dirty="0" smtClean="0"/>
-              <a:t>Visible Nodes (Drug Matrix)</a:t>
-            </a:r>
-          </a:p>
-          <a:p>
-            <a:r>
-              <a:rPr lang="en-US" dirty="0" smtClean="0"/>
-              <a:t>2908 </a:t>
-            </a:r>
-            <a:r>
-              <a:rPr lang="en-US" dirty="0" smtClean="0"/>
-              <a:t>Hidden Nodes (Reactions)</a:t>
+              <a:t>2908 Hidden Nodes (Reactions)</a:t>
             </a:r>
           </a:p>
           <a:p>
@@ -8579,11 +8559,7 @@
           <a:p>
             <a:r>
               <a:rPr lang="en-US" dirty="0" smtClean="0"/>
-              <a:t>Top </a:t>
-            </a:r>
-            <a:r>
-              <a:rPr lang="en-US" dirty="0" smtClean="0"/>
-              <a:t>Similar Drugs Sample</a:t>
+              <a:t>Top Similar Drugs Sample</a:t>
             </a:r>
             <a:endParaRPr lang="en-US" dirty="0"/>
           </a:p>

</xml_diff>

<commit_message>
update per docs and plotting
</commit_message>
<xml_diff>
--- a/docs/OpenFDA Adverse.pptx
+++ b/docs/OpenFDA Adverse.pptx
@@ -6326,7 +6326,7 @@
       </p:sp>
       <p:pic>
         <p:nvPicPr>
-          <p:cNvPr id="6" name="Content Placeholder 5">
+          <p:cNvPr id="3" name="Content Placeholder 2">
             <a:hlinkClick r:id="rId2"/>
           </p:cNvPr>
           <p:cNvPicPr>
@@ -6350,14 +6350,14 @@
         </p:blipFill>
         <p:spPr>
           <a:xfrm>
-            <a:off x="495299" y="2122877"/>
-            <a:ext cx="5292437" cy="4038932"/>
+            <a:off x="323993" y="1888763"/>
+            <a:ext cx="5805051" cy="4353789"/>
           </a:xfrm>
         </p:spPr>
       </p:pic>
       <p:pic>
         <p:nvPicPr>
-          <p:cNvPr id="7" name="Picture 6">
+          <p:cNvPr id="5" name="Picture 4">
             <a:hlinkClick r:id="rId4"/>
           </p:cNvPr>
           <p:cNvPicPr>
@@ -6379,8 +6379,8 @@
         </p:blipFill>
         <p:spPr>
           <a:xfrm>
-            <a:off x="6122370" y="2122877"/>
-            <a:ext cx="5385242" cy="4038932"/>
+            <a:off x="6314209" y="1899153"/>
+            <a:ext cx="5365173" cy="4353789"/>
           </a:xfrm>
           <a:prstGeom prst="rect">
             <a:avLst/>
@@ -8596,7 +8596,7 @@
           <p:nvPr>
             <p:extLst>
               <p:ext uri="{D42A27DB-BD31-4B8C-83A1-F6EECF244321}">
-                <p14:modId xmlns:p14="http://schemas.microsoft.com/office/powerpoint/2010/main" val="350574678"/>
+                <p14:modId xmlns:p14="http://schemas.microsoft.com/office/powerpoint/2010/main" val="3473308150"/>
               </p:ext>
             </p:extLst>
           </p:nvPr>
@@ -8654,7 +8654,7 @@
                     <a:p>
                       <a:r>
                         <a:rPr lang="en-US" dirty="0" smtClean="0"/>
-                        <a:t>ASS</a:t>
+                        <a:t>ERYTHROCIN</a:t>
                       </a:r>
                       <a:endParaRPr lang="en-US" dirty="0"/>
                     </a:p>
@@ -8670,7 +8670,11 @@
                     <a:p>
                       <a:r>
                         <a:rPr lang="en-US" dirty="0" smtClean="0"/>
-                        <a:t>MENATETRENONE</a:t>
+                        <a:t>FOLBEE</a:t>
+                      </a:r>
+                      <a:r>
+                        <a:rPr lang="en-US" baseline="0" dirty="0" smtClean="0"/>
+                        <a:t> PLUS</a:t>
                       </a:r>
                       <a:endParaRPr lang="en-US" dirty="0"/>
                     </a:p>
@@ -8686,7 +8690,11 @@
                     <a:p>
                       <a:r>
                         <a:rPr lang="en-US" dirty="0" smtClean="0"/>
-                        <a:t>VICODIN</a:t>
+                        <a:t>FUSIDATE</a:t>
+                      </a:r>
+                      <a:r>
+                        <a:rPr lang="en-US" baseline="0" dirty="0" smtClean="0"/>
+                        <a:t> SODIUM</a:t>
                       </a:r>
                       <a:endParaRPr lang="en-US" dirty="0"/>
                     </a:p>
@@ -8702,11 +8710,7 @@
                     <a:p>
                       <a:r>
                         <a:rPr lang="en-US" dirty="0" smtClean="0"/>
-                        <a:t>SPIRIVA</a:t>
-                      </a:r>
-                      <a:r>
-                        <a:rPr lang="en-US" baseline="0" dirty="0" smtClean="0"/>
-                        <a:t> (TIOTROPIOUM BROMIDE)</a:t>
+                        <a:t>METFORMINE</a:t>
                       </a:r>
                       <a:endParaRPr lang="en-US" dirty="0"/>
                     </a:p>
@@ -8722,11 +8726,7 @@
                     <a:p>
                       <a:r>
                         <a:rPr lang="en-US" dirty="0" smtClean="0"/>
-                        <a:t>ENALAPRIL</a:t>
-                      </a:r>
-                      <a:r>
-                        <a:rPr lang="en-US" baseline="0" dirty="0" smtClean="0"/>
-                        <a:t> MALEATE AND HYDROCHLOROTHIAZIDE</a:t>
+                        <a:t>NOLVADEX D</a:t>
                       </a:r>
                       <a:endParaRPr lang="en-US" dirty="0"/>
                     </a:p>
@@ -8742,7 +8742,7 @@
                     <a:p>
                       <a:r>
                         <a:rPr lang="en-US" dirty="0" smtClean="0"/>
-                        <a:t>PRIMIDONE</a:t>
+                        <a:t>HERBESSOR R</a:t>
                       </a:r>
                       <a:endParaRPr lang="en-US" dirty="0"/>
                     </a:p>
@@ -8758,7 +8758,7 @@
                     <a:p>
                       <a:r>
                         <a:rPr lang="en-US" dirty="0" smtClean="0"/>
-                        <a:t>CEFAMEZIN</a:t>
+                        <a:t>SEISHOKU (SODIUM CHLORIDE) (SODIUM CHLORIDE)</a:t>
                       </a:r>
                       <a:endParaRPr lang="en-US" dirty="0"/>
                     </a:p>
@@ -8774,11 +8774,7 @@
                     <a:p>
                       <a:r>
                         <a:rPr lang="en-US" dirty="0" smtClean="0"/>
-                        <a:t>EPOETIN</a:t>
-                      </a:r>
-                      <a:r>
-                        <a:rPr lang="en-US" baseline="0" dirty="0" smtClean="0"/>
-                        <a:t> BETA</a:t>
+                        <a:t>BINORAC</a:t>
                       </a:r>
                       <a:endParaRPr lang="en-US" dirty="0"/>
                     </a:p>
@@ -8792,6 +8788,10 @@
                     <a:bodyPr/>
                     <a:lstStyle/>
                     <a:p>
+                      <a:r>
+                        <a:rPr lang="en-US" dirty="0" smtClean="0"/>
+                        <a:t>PROPRANOLOL</a:t>
+                      </a:r>
                       <a:endParaRPr lang="en-US" dirty="0"/>
                     </a:p>
                   </a:txBody>

</xml_diff>